<commit_message>
Module 2 Lesson Links
</commit_message>
<xml_diff>
--- a/Complimentary Course Content/Module2/Lessons/Module2_Lesson5 Working with Node.js and Azure Table Storage.pptx
+++ b/Complimentary Course Content/Module2/Lessons/Module2_Lesson5 Working with Node.js and Azure Table Storage.pptx
@@ -187,7 +187,7 @@
       </p14:sectionLst>
     </p:ext>
     <p:ext uri="{EFAFB233-063F-42B5-8137-9DF3F51BA10A}">
-      <p15:sldGuideLst xmlns="" xmlns:p15="http://schemas.microsoft.com/office/powerpoint/2012/main">
+      <p15:sldGuideLst xmlns:p15="http://schemas.microsoft.com/office/powerpoint/2012/main" xmlns="">
         <p15:guide id="1" orient="horz" pos="3952" userDrawn="1">
           <p15:clr>
             <a:srgbClr val="A4A3A4"/>
@@ -306,7 +306,7 @@
             <a:fld id="{2E5CA586-3557-4985-BCD4-35EF5AC8B4A4}" type="datetimeFigureOut">
               <a:rPr lang="en-US" smtClean="0"/>
               <a:pPr/>
-              <a:t>6/23/16</a:t>
+              <a:t>7/1/16</a:t>
             </a:fld>
             <a:endParaRPr lang="en-US"/>
           </a:p>
@@ -993,11 +993,7 @@
             </a:pPr>
             <a:r>
               <a:rPr lang="en-US" b="0" dirty="0" smtClean="0"/>
-              <a:t>We </a:t>
-            </a:r>
-            <a:r>
-              <a:rPr lang="en-US" b="0" dirty="0" smtClean="0"/>
-              <a:t>will</a:t>
+              <a:t>We will</a:t>
             </a:r>
             <a:r>
               <a:rPr lang="en-US" b="0" baseline="0" dirty="0" smtClean="0"/>
@@ -4130,11 +4126,7 @@
             </a:r>
             <a:r>
               <a:rPr lang="en-US" baseline="0" dirty="0" smtClean="0"/>
-              <a:t> </a:t>
-            </a:r>
-            <a:r>
-              <a:rPr lang="en-US" baseline="0" dirty="0" smtClean="0"/>
-              <a:t>data won’t be lost when the app is restarted or when it crashes</a:t>
+              <a:t> data won’t be lost when the app is restarted or when it crashes</a:t>
             </a:r>
           </a:p>
           <a:p>
@@ -4352,11 +4344,7 @@
             </a:r>
             <a:r>
               <a:rPr lang="en-US" b="0" baseline="0" dirty="0" smtClean="0"/>
-              <a:t> </a:t>
-            </a:r>
-            <a:r>
-              <a:rPr lang="en-US" b="0" baseline="0" dirty="0" smtClean="0"/>
-              <a:t>offers many storage options for different purposes</a:t>
+              <a:t> offers many storage options for different purposes</a:t>
             </a:r>
             <a:endParaRPr lang="en-US" b="0" dirty="0" smtClean="0"/>
           </a:p>
@@ -4884,11 +4872,7 @@
             </a:r>
             <a:r>
               <a:rPr lang="en-US" baseline="0" dirty="0" smtClean="0"/>
-              <a:t> </a:t>
-            </a:r>
-            <a:r>
-              <a:rPr lang="en-US" baseline="0" dirty="0" smtClean="0"/>
-              <a:t>Theorem: You can have 2 our of 3 (Consistency, availability and partition). </a:t>
+              <a:t> Theorem: You can have 2 our of 3 (Consistency, availability and partition). </a:t>
             </a:r>
           </a:p>
           <a:p>
@@ -4950,7 +4934,6 @@
               <a:rPr lang="en-US" b="1" dirty="0" smtClean="0"/>
               <a:t>References:</a:t>
             </a:r>
-            <a:endParaRPr lang="en-US" b="1" dirty="0" smtClean="0"/>
           </a:p>
           <a:p>
             <a:pPr marL="171450" indent="-171450">
@@ -5096,11 +5079,7 @@
             </a:pPr>
             <a:r>
               <a:rPr lang="en-US" dirty="0" smtClean="0"/>
-              <a:t>https</a:t>
-            </a:r>
-            <a:r>
-              <a:rPr lang="en-US" dirty="0" smtClean="0"/>
-              <a:t>://</a:t>
+              <a:t>https://</a:t>
             </a:r>
             <a:r>
               <a:rPr lang="en-US" dirty="0" err="1" smtClean="0"/>
@@ -35020,7 +34999,7 @@
                 <a:latin typeface="Segoe UI"/>
               </a:rPr>
               <a:pPr/>
-              <a:t>6/23/16</a:t>
+              <a:t>7/1/16</a:t>
             </a:fld>
             <a:endParaRPr lang="en-US">
               <a:solidFill>
@@ -35430,7 +35409,7 @@
           <a:p>
             <a:fld id="{0459C166-16D3-4A25-A2F8-C51E0E346B22}" type="datetimeFigureOut">
               <a:rPr lang="en-US" smtClean="0"/>
-              <a:t>6/23/16</a:t>
+              <a:t>7/1/16</a:t>
             </a:fld>
             <a:endParaRPr lang="en-US"/>
           </a:p>
@@ -35600,7 +35579,7 @@
           <a:p>
             <a:fld id="{0459C166-16D3-4A25-A2F8-C51E0E346B22}" type="datetimeFigureOut">
               <a:rPr lang="en-US" smtClean="0"/>
-              <a:t>6/23/16</a:t>
+              <a:t>7/1/16</a:t>
             </a:fld>
             <a:endParaRPr lang="en-US"/>
           </a:p>
@@ -35870,7 +35849,7 @@
                 <a:latin typeface="Segoe UI"/>
               </a:rPr>
               <a:pPr/>
-              <a:t>6/23/16</a:t>
+              <a:t>7/1/16</a:t>
             </a:fld>
             <a:endParaRPr lang="en-US">
               <a:solidFill>
@@ -36287,7 +36266,7 @@
                 <a:latin typeface="Segoe UI"/>
               </a:rPr>
               <a:pPr/>
-              <a:t>6/23/16</a:t>
+              <a:t>7/1/16</a:t>
             </a:fld>
             <a:endParaRPr lang="en-US">
               <a:solidFill>
@@ -36721,7 +36700,7 @@
                 <a:latin typeface="Segoe UI"/>
               </a:rPr>
               <a:pPr/>
-              <a:t>6/23/16</a:t>
+              <a:t>7/1/16</a:t>
             </a:fld>
             <a:endParaRPr lang="en-US">
               <a:solidFill>
@@ -37720,7 +37699,7 @@
           <a:p>
             <a:fld id="{0459C166-16D3-4A25-A2F8-C51E0E346B22}" type="datetimeFigureOut">
               <a:rPr lang="en-US" smtClean="0"/>
-              <a:t>6/23/16</a:t>
+              <a:t>7/1/16</a:t>
             </a:fld>
             <a:endParaRPr lang="en-US"/>
           </a:p>
@@ -38087,7 +38066,7 @@
           <a:p>
             <a:fld id="{0459C166-16D3-4A25-A2F8-C51E0E346B22}" type="datetimeFigureOut">
               <a:rPr lang="en-US" smtClean="0"/>
-              <a:t>6/23/16</a:t>
+              <a:t>7/1/16</a:t>
             </a:fld>
             <a:endParaRPr lang="en-US"/>
           </a:p>
@@ -38205,7 +38184,7 @@
           <a:p>
             <a:fld id="{0459C166-16D3-4A25-A2F8-C51E0E346B22}" type="datetimeFigureOut">
               <a:rPr lang="en-US" smtClean="0"/>
-              <a:t>6/23/16</a:t>
+              <a:t>7/1/16</a:t>
             </a:fld>
             <a:endParaRPr lang="en-US"/>
           </a:p>
@@ -38512,7 +38491,7 @@
                 <a:latin typeface="Segoe UI"/>
               </a:rPr>
               <a:pPr/>
-              <a:t>6/23/16</a:t>
+              <a:t>7/1/16</a:t>
             </a:fld>
             <a:endParaRPr lang="en-US">
               <a:solidFill>
@@ -38887,7 +38866,7 @@
                 <a:latin typeface="Segoe UI"/>
               </a:rPr>
               <a:pPr/>
-              <a:t>6/23/16</a:t>
+              <a:t>7/1/16</a:t>
             </a:fld>
             <a:endParaRPr lang="en-US">
               <a:solidFill>
@@ -39934,7 +39913,7 @@
                 <a:latin typeface="Segoe UI"/>
               </a:rPr>
               <a:pPr/>
-              <a:t>6/23/16</a:t>
+              <a:t>7/1/16</a:t>
             </a:fld>
             <a:endParaRPr lang="en-US">
               <a:solidFill>
@@ -40309,7 +40288,7 @@
                 <a:latin typeface="Segoe UI"/>
               </a:rPr>
               <a:pPr/>
-              <a:t>6/23/16</a:t>
+              <a:t>7/1/16</a:t>
             </a:fld>
             <a:endParaRPr lang="en-US">
               <a:solidFill>
@@ -41323,7 +41302,7 @@
                 <a:latin typeface="Segoe UI"/>
               </a:rPr>
               <a:pPr/>
-              <a:t>6/23/16</a:t>
+              <a:t>7/1/16</a:t>
             </a:fld>
             <a:endParaRPr lang="en-US">
               <a:solidFill>
@@ -41698,7 +41677,7 @@
                 <a:latin typeface="Segoe UI"/>
               </a:rPr>
               <a:pPr/>
-              <a:t>6/23/16</a:t>
+              <a:t>7/1/16</a:t>
             </a:fld>
             <a:endParaRPr lang="en-US">
               <a:solidFill>
@@ -44699,7 +44678,7 @@
           <a:p>
             <a:fld id="{0459C166-16D3-4A25-A2F8-C51E0E346B22}" type="datetimeFigureOut">
               <a:rPr lang="en-US" smtClean="0"/>
-              <a:t>6/23/16</a:t>
+              <a:t>7/1/16</a:t>
             </a:fld>
             <a:endParaRPr lang="en-US"/>
           </a:p>
@@ -45284,7 +45263,7 @@
           <p:nvPr>
             <p:extLst>
               <p:ext uri="{D42A27DB-BD31-4B8C-83A1-F6EECF244321}">
-                <p14:modId xmlns:p14="http://schemas.microsoft.com/office/powerpoint/2010/main" val="3852783762"/>
+                <p14:modId xmlns:p14="http://schemas.microsoft.com/office/powerpoint/2010/main" val="1161652741"/>
               </p:ext>
             </p:extLst>
           </p:nvPr>
@@ -45303,21 +45282,21 @@
                 <a:gridCol w="2487584">
                   <a:extLst>
                     <a:ext uri="{9D8B030D-6E8A-4147-A177-3AD203B41FA5}">
-                      <a16:colId xmlns="" xmlns:a16="http://schemas.microsoft.com/office/drawing/2014/main" val="48614039"/>
+                      <a16:colId xmlns:a16="http://schemas.microsoft.com/office/drawing/2014/main" xmlns="" val="48614039"/>
                     </a:ext>
                   </a:extLst>
                 </a:gridCol>
                 <a:gridCol w="4099977">
                   <a:extLst>
                     <a:ext uri="{9D8B030D-6E8A-4147-A177-3AD203B41FA5}">
-                      <a16:colId xmlns="" xmlns:a16="http://schemas.microsoft.com/office/drawing/2014/main" val="20001"/>
+                      <a16:colId xmlns:a16="http://schemas.microsoft.com/office/drawing/2014/main" xmlns="" val="20001"/>
                     </a:ext>
                   </a:extLst>
                 </a:gridCol>
                 <a:gridCol w="4099977">
                   <a:extLst>
                     <a:ext uri="{9D8B030D-6E8A-4147-A177-3AD203B41FA5}">
-                      <a16:colId xmlns="" xmlns:a16="http://schemas.microsoft.com/office/drawing/2014/main" val="20002"/>
+                      <a16:colId xmlns:a16="http://schemas.microsoft.com/office/drawing/2014/main" xmlns="" val="20002"/>
                     </a:ext>
                   </a:extLst>
                 </a:gridCol>
@@ -45330,7 +45309,7 @@
                     <a:p>
                       <a:pPr algn="ctr"/>
                       <a:r>
-                        <a:rPr lang="en-US" b="0" dirty="0">
+                        <a:rPr lang="en-US" b="1" dirty="0">
                           <a:solidFill>
                             <a:schemeClr val="bg1"/>
                           </a:solidFill>
@@ -45391,7 +45370,7 @@
                 </a:tc>
                 <a:extLst>
                   <a:ext uri="{0D108BD9-81ED-4DB2-BD59-A6C34878D82A}">
-                    <a16:rowId xmlns="" xmlns:a16="http://schemas.microsoft.com/office/drawing/2014/main" val="679667022"/>
+                    <a16:rowId xmlns:a16="http://schemas.microsoft.com/office/drawing/2014/main" xmlns="" val="679667022"/>
                   </a:ext>
                 </a:extLst>
               </a:tr>
@@ -45402,7 +45381,7 @@
                     <a:lstStyle/>
                     <a:p>
                       <a:r>
-                        <a:rPr lang="en-US" dirty="0"/>
+                        <a:rPr lang="en-US" b="1" dirty="0"/>
                         <a:t>Tables</a:t>
                       </a:r>
                     </a:p>
@@ -45463,7 +45442,7 @@
                 </a:tc>
                 <a:extLst>
                   <a:ext uri="{0D108BD9-81ED-4DB2-BD59-A6C34878D82A}">
-                    <a16:rowId xmlns="" xmlns:a16="http://schemas.microsoft.com/office/drawing/2014/main" val="2034482246"/>
+                    <a16:rowId xmlns:a16="http://schemas.microsoft.com/office/drawing/2014/main" xmlns="" val="2034482246"/>
                   </a:ext>
                 </a:extLst>
               </a:tr>
@@ -45474,7 +45453,7 @@
                     <a:lstStyle/>
                     <a:p>
                       <a:r>
-                        <a:rPr lang="en-US" dirty="0"/>
+                        <a:rPr lang="en-US" b="1" dirty="0"/>
                         <a:t>Entities</a:t>
                       </a:r>
                     </a:p>
@@ -45529,7 +45508,7 @@
                 </a:tc>
                 <a:extLst>
                   <a:ext uri="{0D108BD9-81ED-4DB2-BD59-A6C34878D82A}">
-                    <a16:rowId xmlns="" xmlns:a16="http://schemas.microsoft.com/office/drawing/2014/main" val="682465758"/>
+                    <a16:rowId xmlns:a16="http://schemas.microsoft.com/office/drawing/2014/main" xmlns="" val="682465758"/>
                   </a:ext>
                 </a:extLst>
               </a:tr>
@@ -45540,7 +45519,7 @@
                     <a:lstStyle/>
                     <a:p>
                       <a:r>
-                        <a:rPr lang="en-US" dirty="0"/>
+                        <a:rPr lang="en-US" b="1" dirty="0"/>
                         <a:t>Properties</a:t>
                       </a:r>
                     </a:p>
@@ -45600,7 +45579,7 @@
                 </a:tc>
                 <a:extLst>
                   <a:ext uri="{0D108BD9-81ED-4DB2-BD59-A6C34878D82A}">
-                    <a16:rowId xmlns="" xmlns:a16="http://schemas.microsoft.com/office/drawing/2014/main" val="4230228483"/>
+                    <a16:rowId xmlns:a16="http://schemas.microsoft.com/office/drawing/2014/main" xmlns="" val="4230228483"/>
                   </a:ext>
                 </a:extLst>
               </a:tr>
@@ -45611,14 +45590,14 @@
                     <a:lstStyle/>
                     <a:p>
                       <a:r>
-                        <a:rPr lang="en-US" dirty="0"/>
+                        <a:rPr lang="en-US" b="1" dirty="0"/>
                         <a:t>Partition</a:t>
                       </a:r>
                       <a:r>
-                        <a:rPr lang="en-US" baseline="0" dirty="0"/>
+                        <a:rPr lang="en-US" b="1" baseline="0" dirty="0"/>
                         <a:t> Keys</a:t>
                       </a:r>
-                      <a:endParaRPr lang="en-US" dirty="0"/>
+                      <a:endParaRPr lang="en-US" b="1" dirty="0"/>
                     </a:p>
                   </a:txBody>
                   <a:tcPr>
@@ -45680,7 +45659,7 @@
                 </a:tc>
                 <a:extLst>
                   <a:ext uri="{0D108BD9-81ED-4DB2-BD59-A6C34878D82A}">
-                    <a16:rowId xmlns="" xmlns:a16="http://schemas.microsoft.com/office/drawing/2014/main" val="3329658239"/>
+                    <a16:rowId xmlns:a16="http://schemas.microsoft.com/office/drawing/2014/main" xmlns="" val="3329658239"/>
                   </a:ext>
                 </a:extLst>
               </a:tr>
@@ -45691,7 +45670,7 @@
                     <a:lstStyle/>
                     <a:p>
                       <a:r>
-                        <a:rPr lang="en-US" dirty="0"/>
+                        <a:rPr lang="en-US" b="1" dirty="0"/>
                         <a:t>Row Keys</a:t>
                       </a:r>
                     </a:p>
@@ -45762,7 +45741,7 @@
                 </a:tc>
                 <a:extLst>
                   <a:ext uri="{0D108BD9-81ED-4DB2-BD59-A6C34878D82A}">
-                    <a16:rowId xmlns="" xmlns:a16="http://schemas.microsoft.com/office/drawing/2014/main" val="10005"/>
+                    <a16:rowId xmlns:a16="http://schemas.microsoft.com/office/drawing/2014/main" xmlns="" val="10005"/>
                   </a:ext>
                 </a:extLst>
               </a:tr>
@@ -48906,7 +48885,6 @@
               <a:rPr lang="en-US" dirty="0"/>
               <a:t>};</a:t>
             </a:r>
-            <a:endParaRPr lang="en-US" dirty="0"/>
           </a:p>
         </p:txBody>
       </p:sp>
@@ -49996,7 +49974,7 @@
           <p:nvPr>
             <p:extLst>
               <p:ext uri="{D42A27DB-BD31-4B8C-83A1-F6EECF244321}">
-                <p14:modId xmlns:p14="http://schemas.microsoft.com/office/powerpoint/2010/main" val="160722577"/>
+                <p14:modId xmlns:p14="http://schemas.microsoft.com/office/powerpoint/2010/main" val="1920879946"/>
               </p:ext>
             </p:extLst>
           </p:nvPr>
@@ -50015,14 +49993,14 @@
                 <a:gridCol w="4065308">
                   <a:extLst>
                     <a:ext uri="{9D8B030D-6E8A-4147-A177-3AD203B41FA5}">
-                      <a16:colId xmlns="" xmlns:a16="http://schemas.microsoft.com/office/drawing/2014/main" val="48614039"/>
+                      <a16:colId xmlns:a16="http://schemas.microsoft.com/office/drawing/2014/main" xmlns="" val="48614039"/>
                     </a:ext>
                   </a:extLst>
                 </a:gridCol>
                 <a:gridCol w="6700344">
                   <a:extLst>
                     <a:ext uri="{9D8B030D-6E8A-4147-A177-3AD203B41FA5}">
-                      <a16:colId xmlns="" xmlns:a16="http://schemas.microsoft.com/office/drawing/2014/main" val="20001"/>
+                      <a16:colId xmlns:a16="http://schemas.microsoft.com/office/drawing/2014/main" xmlns="" val="20001"/>
                     </a:ext>
                   </a:extLst>
                 </a:gridCol>
@@ -50035,7 +50013,7 @@
                     <a:p>
                       <a:pPr algn="ctr"/>
                       <a:r>
-                        <a:rPr lang="en-US" b="0" dirty="0">
+                        <a:rPr lang="en-US" b="1" dirty="0">
                           <a:solidFill>
                             <a:schemeClr val="bg1"/>
                           </a:solidFill>
@@ -50074,7 +50052,7 @@
                 </a:tc>
                 <a:extLst>
                   <a:ext uri="{0D108BD9-81ED-4DB2-BD59-A6C34878D82A}">
-                    <a16:rowId xmlns="" xmlns:a16="http://schemas.microsoft.com/office/drawing/2014/main" val="679667022"/>
+                    <a16:rowId xmlns:a16="http://schemas.microsoft.com/office/drawing/2014/main" xmlns="" val="679667022"/>
                   </a:ext>
                 </a:extLst>
               </a:tr>
@@ -50085,10 +50063,10 @@
                     <a:lstStyle/>
                     <a:p>
                       <a:r>
-                        <a:rPr lang="en-US" dirty="0" err="1"/>
+                        <a:rPr lang="en-US" b="1" dirty="0" err="1"/>
                         <a:t>replaceEntity</a:t>
                       </a:r>
-                      <a:endParaRPr lang="en-US" dirty="0"/>
+                      <a:endParaRPr lang="en-US" b="1" dirty="0"/>
                     </a:p>
                   </a:txBody>
                   <a:tcPr>
@@ -50137,7 +50115,7 @@
                 </a:tc>
                 <a:extLst>
                   <a:ext uri="{0D108BD9-81ED-4DB2-BD59-A6C34878D82A}">
-                    <a16:rowId xmlns="" xmlns:a16="http://schemas.microsoft.com/office/drawing/2014/main" val="2034482246"/>
+                    <a16:rowId xmlns:a16="http://schemas.microsoft.com/office/drawing/2014/main" xmlns="" val="2034482246"/>
                   </a:ext>
                 </a:extLst>
               </a:tr>
@@ -50148,10 +50126,10 @@
                     <a:lstStyle/>
                     <a:p>
                       <a:r>
-                        <a:rPr lang="en-US" dirty="0" err="1"/>
+                        <a:rPr lang="en-US" b="1" dirty="0" err="1"/>
                         <a:t>mergeEntity</a:t>
                       </a:r>
-                      <a:endParaRPr lang="en-US" dirty="0"/>
+                      <a:endParaRPr lang="en-US" b="1" dirty="0"/>
                     </a:p>
                   </a:txBody>
                   <a:tcPr>
@@ -50184,7 +50162,7 @@
                 </a:tc>
                 <a:extLst>
                   <a:ext uri="{0D108BD9-81ED-4DB2-BD59-A6C34878D82A}">
-                    <a16:rowId xmlns="" xmlns:a16="http://schemas.microsoft.com/office/drawing/2014/main" val="682465758"/>
+                    <a16:rowId xmlns:a16="http://schemas.microsoft.com/office/drawing/2014/main" xmlns="" val="682465758"/>
                   </a:ext>
                 </a:extLst>
               </a:tr>
@@ -50195,10 +50173,10 @@
                     <a:lstStyle/>
                     <a:p>
                       <a:r>
-                        <a:rPr lang="en-US" dirty="0" err="1"/>
+                        <a:rPr lang="en-US" b="1" dirty="0" err="1"/>
                         <a:t>insertOrReplaceEntity</a:t>
                       </a:r>
-                      <a:endParaRPr lang="en-US" dirty="0"/>
+                      <a:endParaRPr lang="en-US" b="1" dirty="0"/>
                     </a:p>
                   </a:txBody>
                   <a:tcPr>
@@ -50232,7 +50210,7 @@
                 </a:tc>
                 <a:extLst>
                   <a:ext uri="{0D108BD9-81ED-4DB2-BD59-A6C34878D82A}">
-                    <a16:rowId xmlns="" xmlns:a16="http://schemas.microsoft.com/office/drawing/2014/main" val="4230228483"/>
+                    <a16:rowId xmlns:a16="http://schemas.microsoft.com/office/drawing/2014/main" xmlns="" val="4230228483"/>
                   </a:ext>
                 </a:extLst>
               </a:tr>
@@ -50243,14 +50221,14 @@
                     <a:lstStyle/>
                     <a:p>
                       <a:r>
-                        <a:rPr lang="en-US" dirty="0" err="1"/>
+                        <a:rPr lang="en-US" b="1" dirty="0" err="1"/>
                         <a:t>insertOr</a:t>
                       </a:r>
                       <a:r>
-                        <a:rPr lang="en-US" baseline="0" dirty="0" err="1"/>
+                        <a:rPr lang="en-US" b="1" baseline="0" dirty="0" err="1"/>
                         <a:t>MergeEntity</a:t>
                       </a:r>
-                      <a:endParaRPr lang="en-US" dirty="0"/>
+                      <a:endParaRPr lang="en-US" b="1" dirty="0"/>
                     </a:p>
                   </a:txBody>
                   <a:tcPr>
@@ -50284,7 +50262,7 @@
                 </a:tc>
                 <a:extLst>
                   <a:ext uri="{0D108BD9-81ED-4DB2-BD59-A6C34878D82A}">
-                    <a16:rowId xmlns="" xmlns:a16="http://schemas.microsoft.com/office/drawing/2014/main" val="3329658239"/>
+                    <a16:rowId xmlns:a16="http://schemas.microsoft.com/office/drawing/2014/main" xmlns="" val="3329658239"/>
                   </a:ext>
                 </a:extLst>
               </a:tr>
@@ -51136,11 +51114,11 @@
   <p:clrMapOvr>
     <a:masterClrMapping/>
   </p:clrMapOvr>
-  <mc:AlternateContent xmlns:mc="http://schemas.openxmlformats.org/markup-compatibility/2006">
-    <mc:Choice xmlns:p14="http://schemas.microsoft.com/office/powerpoint/2010/main" Requires="p14">
+  <mc:AlternateContent xmlns:mc="http://schemas.openxmlformats.org/markup-compatibility/2006" xmlns:p14="http://schemas.microsoft.com/office/powerpoint/2010/main">
+    <mc:Choice Requires="p14">
       <p:transition spd="slow" p14:dur="2000"/>
     </mc:Choice>
-    <mc:Fallback>
+    <mc:Fallback xmlns="">
       <p:transition xmlns:p14="http://schemas.microsoft.com/office/powerpoint/2010/main" spd="slow"/>
     </mc:Fallback>
   </mc:AlternateContent>
@@ -51378,7 +51356,7 @@
           <p:nvPr>
             <p:extLst>
               <p:ext uri="{D42A27DB-BD31-4B8C-83A1-F6EECF244321}">
-                <p14:modId xmlns:p14="http://schemas.microsoft.com/office/powerpoint/2010/main" val="3379216328"/>
+                <p14:modId xmlns:p14="http://schemas.microsoft.com/office/powerpoint/2010/main" val="2114667141"/>
               </p:ext>
             </p:extLst>
           </p:nvPr>
@@ -51397,14 +51375,14 @@
                 <a:gridCol w="4065308">
                   <a:extLst>
                     <a:ext uri="{9D8B030D-6E8A-4147-A177-3AD203B41FA5}">
-                      <a16:colId xmlns="" xmlns:a16="http://schemas.microsoft.com/office/drawing/2014/main" val="48614039"/>
+                      <a16:colId xmlns:a16="http://schemas.microsoft.com/office/drawing/2014/main" xmlns="" val="48614039"/>
                     </a:ext>
                   </a:extLst>
                 </a:gridCol>
                 <a:gridCol w="6700344">
                   <a:extLst>
                     <a:ext uri="{9D8B030D-6E8A-4147-A177-3AD203B41FA5}">
-                      <a16:colId xmlns="" xmlns:a16="http://schemas.microsoft.com/office/drawing/2014/main" val="20001"/>
+                      <a16:colId xmlns:a16="http://schemas.microsoft.com/office/drawing/2014/main" xmlns="" val="20001"/>
                     </a:ext>
                   </a:extLst>
                 </a:gridCol>
@@ -51417,7 +51395,7 @@
                     <a:p>
                       <a:pPr algn="ctr"/>
                       <a:r>
-                        <a:rPr lang="en-US" b="0" dirty="0">
+                        <a:rPr lang="en-US" b="1" dirty="0">
                           <a:solidFill>
                             <a:schemeClr val="bg1"/>
                           </a:solidFill>
@@ -51456,7 +51434,7 @@
                 </a:tc>
                 <a:extLst>
                   <a:ext uri="{0D108BD9-81ED-4DB2-BD59-A6C34878D82A}">
-                    <a16:rowId xmlns="" xmlns:a16="http://schemas.microsoft.com/office/drawing/2014/main" val="679667022"/>
+                    <a16:rowId xmlns:a16="http://schemas.microsoft.com/office/drawing/2014/main" xmlns="" val="679667022"/>
                   </a:ext>
                 </a:extLst>
               </a:tr>
@@ -51467,7 +51445,7 @@
                     <a:lstStyle/>
                     <a:p>
                       <a:r>
-                        <a:rPr lang="en-US" dirty="0"/>
+                        <a:rPr lang="en-US" b="1" dirty="0"/>
                         <a:t>clear</a:t>
                       </a:r>
                     </a:p>
@@ -51523,7 +51501,7 @@
                 </a:tc>
                 <a:extLst>
                   <a:ext uri="{0D108BD9-81ED-4DB2-BD59-A6C34878D82A}">
-                    <a16:rowId xmlns="" xmlns:a16="http://schemas.microsoft.com/office/drawing/2014/main" val="2034482246"/>
+                    <a16:rowId xmlns:a16="http://schemas.microsoft.com/office/drawing/2014/main" xmlns="" val="2034482246"/>
                   </a:ext>
                 </a:extLst>
               </a:tr>
@@ -51534,10 +51512,10 @@
                     <a:lstStyle/>
                     <a:p>
                       <a:r>
-                        <a:rPr lang="en-US" dirty="0" err="1"/>
+                        <a:rPr lang="en-US" b="1" dirty="0" err="1"/>
                         <a:t>getOperations</a:t>
                       </a:r>
-                      <a:endParaRPr lang="en-US" dirty="0"/>
+                      <a:endParaRPr lang="en-US" b="1" dirty="0"/>
                     </a:p>
                   </a:txBody>
                   <a:tcPr>
@@ -51575,7 +51553,7 @@
                 </a:tc>
                 <a:extLst>
                   <a:ext uri="{0D108BD9-81ED-4DB2-BD59-A6C34878D82A}">
-                    <a16:rowId xmlns="" xmlns:a16="http://schemas.microsoft.com/office/drawing/2014/main" val="682465758"/>
+                    <a16:rowId xmlns:a16="http://schemas.microsoft.com/office/drawing/2014/main" xmlns="" val="682465758"/>
                   </a:ext>
                 </a:extLst>
               </a:tr>
@@ -51586,10 +51564,10 @@
                     <a:lstStyle/>
                     <a:p>
                       <a:r>
-                        <a:rPr lang="en-US" dirty="0" err="1"/>
+                        <a:rPr lang="en-US" b="1" dirty="0" err="1"/>
                         <a:t>hasOperations</a:t>
                       </a:r>
-                      <a:endParaRPr lang="en-US" dirty="0"/>
+                      <a:endParaRPr lang="en-US" b="1" dirty="0"/>
                     </a:p>
                   </a:txBody>
                   <a:tcPr>
@@ -51627,7 +51605,7 @@
                 </a:tc>
                 <a:extLst>
                   <a:ext uri="{0D108BD9-81ED-4DB2-BD59-A6C34878D82A}">
-                    <a16:rowId xmlns="" xmlns:a16="http://schemas.microsoft.com/office/drawing/2014/main" val="4230228483"/>
+                    <a16:rowId xmlns:a16="http://schemas.microsoft.com/office/drawing/2014/main" xmlns="" val="4230228483"/>
                   </a:ext>
                 </a:extLst>
               </a:tr>
@@ -51638,10 +51616,10 @@
                     <a:lstStyle/>
                     <a:p>
                       <a:r>
-                        <a:rPr lang="en-US" dirty="0" err="1"/>
+                        <a:rPr lang="en-US" b="1" dirty="0" err="1"/>
                         <a:t>removeOperations</a:t>
                       </a:r>
-                      <a:endParaRPr lang="en-US" dirty="0"/>
+                      <a:endParaRPr lang="en-US" b="1" dirty="0"/>
                     </a:p>
                   </a:txBody>
                   <a:tcPr>
@@ -51679,7 +51657,7 @@
                 </a:tc>
                 <a:extLst>
                   <a:ext uri="{0D108BD9-81ED-4DB2-BD59-A6C34878D82A}">
-                    <a16:rowId xmlns="" xmlns:a16="http://schemas.microsoft.com/office/drawing/2014/main" val="3329658239"/>
+                    <a16:rowId xmlns:a16="http://schemas.microsoft.com/office/drawing/2014/main" xmlns="" val="3329658239"/>
                   </a:ext>
                 </a:extLst>
               </a:tr>
@@ -51690,7 +51668,7 @@
                     <a:lstStyle/>
                     <a:p>
                       <a:r>
-                        <a:rPr lang="en-US" dirty="0"/>
+                        <a:rPr lang="en-US" b="1" dirty="0"/>
                         <a:t>size</a:t>
                       </a:r>
                     </a:p>
@@ -51730,7 +51708,7 @@
                 </a:tc>
                 <a:extLst>
                   <a:ext uri="{0D108BD9-81ED-4DB2-BD59-A6C34878D82A}">
-                    <a16:rowId xmlns="" xmlns:a16="http://schemas.microsoft.com/office/drawing/2014/main" val="10005"/>
+                    <a16:rowId xmlns:a16="http://schemas.microsoft.com/office/drawing/2014/main" xmlns="" val="10005"/>
                   </a:ext>
                 </a:extLst>
               </a:tr>
@@ -52727,11 +52705,11 @@
   <p:clrMapOvr>
     <a:masterClrMapping/>
   </p:clrMapOvr>
-  <mc:AlternateContent xmlns:mc="http://schemas.openxmlformats.org/markup-compatibility/2006">
-    <mc:Choice xmlns:p14="http://schemas.microsoft.com/office/powerpoint/2010/main" Requires="p14">
+  <mc:AlternateContent xmlns:mc="http://schemas.openxmlformats.org/markup-compatibility/2006" xmlns:p14="http://schemas.microsoft.com/office/powerpoint/2010/main">
+    <mc:Choice Requires="p14">
       <p:transition spd="slow" p14:dur="2000"/>
     </mc:Choice>
-    <mc:Fallback>
+    <mc:Fallback xmlns="">
       <p:transition xmlns:p14="http://schemas.microsoft.com/office/powerpoint/2010/main" spd="slow"/>
     </mc:Fallback>
   </mc:AlternateContent>
@@ -54027,7 +54005,7 @@
           <p:nvPr>
             <p:extLst>
               <p:ext uri="{D42A27DB-BD31-4B8C-83A1-F6EECF244321}">
-                <p14:modId xmlns:p14="http://schemas.microsoft.com/office/powerpoint/2010/main" val="686782499"/>
+                <p14:modId xmlns:p14="http://schemas.microsoft.com/office/powerpoint/2010/main" val="2246214242"/>
               </p:ext>
             </p:extLst>
           </p:nvPr>
@@ -54046,14 +54024,14 @@
                 <a:gridCol w="4035811">
                   <a:extLst>
                     <a:ext uri="{9D8B030D-6E8A-4147-A177-3AD203B41FA5}">
-                      <a16:colId xmlns="" xmlns:a16="http://schemas.microsoft.com/office/drawing/2014/main" val="48614039"/>
+                      <a16:colId xmlns:a16="http://schemas.microsoft.com/office/drawing/2014/main" xmlns="" val="48614039"/>
                     </a:ext>
                   </a:extLst>
                 </a:gridCol>
                 <a:gridCol w="6651728">
                   <a:extLst>
                     <a:ext uri="{9D8B030D-6E8A-4147-A177-3AD203B41FA5}">
-                      <a16:colId xmlns="" xmlns:a16="http://schemas.microsoft.com/office/drawing/2014/main" val="20001"/>
+                      <a16:colId xmlns:a16="http://schemas.microsoft.com/office/drawing/2014/main" xmlns="" val="20001"/>
                     </a:ext>
                   </a:extLst>
                 </a:gridCol>
@@ -54066,7 +54044,7 @@
                     <a:p>
                       <a:pPr algn="ctr"/>
                       <a:r>
-                        <a:rPr lang="en-US" b="0" dirty="0">
+                        <a:rPr lang="en-US" b="1" dirty="0">
                           <a:solidFill>
                             <a:schemeClr val="bg1"/>
                           </a:solidFill>
@@ -54105,7 +54083,7 @@
                 </a:tc>
                 <a:extLst>
                   <a:ext uri="{0D108BD9-81ED-4DB2-BD59-A6C34878D82A}">
-                    <a16:rowId xmlns="" xmlns:a16="http://schemas.microsoft.com/office/drawing/2014/main" val="679667022"/>
+                    <a16:rowId xmlns:a16="http://schemas.microsoft.com/office/drawing/2014/main" xmlns="" val="679667022"/>
                   </a:ext>
                 </a:extLst>
               </a:tr>
@@ -54116,7 +54094,7 @@
                     <a:lstStyle/>
                     <a:p>
                       <a:r>
-                        <a:rPr lang="en-US" dirty="0"/>
+                        <a:rPr lang="en-US" b="1" dirty="0"/>
                         <a:t>Blob (Object) </a:t>
                       </a:r>
                     </a:p>
@@ -54162,7 +54140,7 @@
                 </a:tc>
                 <a:extLst>
                   <a:ext uri="{0D108BD9-81ED-4DB2-BD59-A6C34878D82A}">
-                    <a16:rowId xmlns="" xmlns:a16="http://schemas.microsoft.com/office/drawing/2014/main" val="2034482246"/>
+                    <a16:rowId xmlns:a16="http://schemas.microsoft.com/office/drawing/2014/main" xmlns="" val="2034482246"/>
                   </a:ext>
                 </a:extLst>
               </a:tr>
@@ -54173,7 +54151,7 @@
                     <a:lstStyle/>
                     <a:p>
                       <a:r>
-                        <a:rPr lang="en-US" dirty="0"/>
+                        <a:rPr lang="en-US" b="1" dirty="0"/>
                         <a:t>Table</a:t>
                       </a:r>
                     </a:p>
@@ -54224,7 +54202,7 @@
                 </a:tc>
                 <a:extLst>
                   <a:ext uri="{0D108BD9-81ED-4DB2-BD59-A6C34878D82A}">
-                    <a16:rowId xmlns="" xmlns:a16="http://schemas.microsoft.com/office/drawing/2014/main" val="682465758"/>
+                    <a16:rowId xmlns:a16="http://schemas.microsoft.com/office/drawing/2014/main" xmlns="" val="682465758"/>
                   </a:ext>
                 </a:extLst>
               </a:tr>
@@ -54235,7 +54213,7 @@
                     <a:lstStyle/>
                     <a:p>
                       <a:r>
-                        <a:rPr lang="en-US" dirty="0"/>
+                        <a:rPr lang="en-US" b="1" dirty="0"/>
                         <a:t>Queue</a:t>
                       </a:r>
                     </a:p>
@@ -54271,7 +54249,7 @@
                 </a:tc>
                 <a:extLst>
                   <a:ext uri="{0D108BD9-81ED-4DB2-BD59-A6C34878D82A}">
-                    <a16:rowId xmlns="" xmlns:a16="http://schemas.microsoft.com/office/drawing/2014/main" val="4230228483"/>
+                    <a16:rowId xmlns:a16="http://schemas.microsoft.com/office/drawing/2014/main" xmlns="" val="4230228483"/>
                   </a:ext>
                 </a:extLst>
               </a:tr>
@@ -54282,7 +54260,7 @@
                     <a:lstStyle/>
                     <a:p>
                       <a:r>
-                        <a:rPr lang="en-US" dirty="0"/>
+                        <a:rPr lang="en-US" b="1" dirty="0"/>
                         <a:t>File</a:t>
                       </a:r>
                     </a:p>
@@ -54317,7 +54295,7 @@
                 </a:tc>
                 <a:extLst>
                   <a:ext uri="{0D108BD9-81ED-4DB2-BD59-A6C34878D82A}">
-                    <a16:rowId xmlns="" xmlns:a16="http://schemas.microsoft.com/office/drawing/2014/main" val="3329658239"/>
+                    <a16:rowId xmlns:a16="http://schemas.microsoft.com/office/drawing/2014/main" xmlns="" val="3329658239"/>
                   </a:ext>
                 </a:extLst>
               </a:tr>
@@ -56333,7 +56311,7 @@
   <a:extraClrSchemeLst/>
   <a:extLst>
     <a:ext uri="{05A4C25C-085E-4340-85A3-A5531E510DB2}">
-      <thm15:themeFamily xmlns="" xmlns:thm15="http://schemas.microsoft.com/office/thememl/2012/main" name="Azure4ResearchTemplate" id="{DD1C6CE8-BDBA-0D4F-9930-3643ABC8EF0E}" vid="{B5C66FD7-0952-994B-96D6-AB3BB89097FE}"/>
+      <thm15:themeFamily xmlns:thm15="http://schemas.microsoft.com/office/thememl/2012/main" xmlns="" name="Azure4ResearchTemplate" id="{DD1C6CE8-BDBA-0D4F-9930-3643ABC8EF0E}" vid="{B5C66FD7-0952-994B-96D6-AB3BB89097FE}"/>
     </a:ext>
   </a:extLst>
 </a:theme>
@@ -56666,7 +56644,7 @@
   <a:extraClrSchemeLst/>
   <a:extLst>
     <a:ext uri="{05A4C25C-085E-4340-85A3-A5531E510DB2}">
-      <thm15:themeFamily xmlns="" xmlns:thm15="http://schemas.microsoft.com/office/thememl/2012/main" name="Azure4ResearchTemplate" id="{DD1C6CE8-BDBA-0D4F-9930-3643ABC8EF0E}" vid="{B5C66FD7-0952-994B-96D6-AB3BB89097FE}"/>
+      <thm15:themeFamily xmlns:thm15="http://schemas.microsoft.com/office/thememl/2012/main" xmlns="" name="Azure4ResearchTemplate" id="{DD1C6CE8-BDBA-0D4F-9930-3643ABC8EF0E}" vid="{B5C66FD7-0952-994B-96D6-AB3BB89097FE}"/>
     </a:ext>
   </a:extLst>
 </a:theme>
@@ -56999,7 +56977,7 @@
   <a:extraClrSchemeLst/>
   <a:extLst>
     <a:ext uri="{05A4C25C-085E-4340-85A3-A5531E510DB2}">
-      <thm15:themeFamily xmlns="" xmlns:thm15="http://schemas.microsoft.com/office/thememl/2012/main" name="Azure4ResearchTemplate" id="{DD1C6CE8-BDBA-0D4F-9930-3643ABC8EF0E}" vid="{B5C66FD7-0952-994B-96D6-AB3BB89097FE}"/>
+      <thm15:themeFamily xmlns:thm15="http://schemas.microsoft.com/office/thememl/2012/main" xmlns="" name="Azure4ResearchTemplate" id="{DD1C6CE8-BDBA-0D4F-9930-3643ABC8EF0E}" vid="{B5C66FD7-0952-994B-96D6-AB3BB89097FE}"/>
     </a:ext>
   </a:extLst>
 </a:theme>
@@ -57268,7 +57246,7 @@
   <a:extraClrSchemeLst/>
   <a:extLst>
     <a:ext uri="{05A4C25C-085E-4340-85A3-A5531E510DB2}">
-      <thm15:themeFamily xmlns="" xmlns:thm15="http://schemas.microsoft.com/office/thememl/2012/main" name="Office Theme" id="{62F939B6-93AF-4DB8-9C6B-D6C7DFDC589F}" vid="{4A3C46E8-61CC-4603-A589-7422A47A8E4A}"/>
+      <thm15:themeFamily xmlns:thm15="http://schemas.microsoft.com/office/thememl/2012/main" xmlns="" name="Office Theme" id="{62F939B6-93AF-4DB8-9C6B-D6C7DFDC589F}" vid="{4A3C46E8-61CC-4603-A589-7422A47A8E4A}"/>
     </a:ext>
   </a:extLst>
 </a:theme>
@@ -57529,7 +57507,7 @@
   <a:extraClrSchemeLst/>
   <a:extLst>
     <a:ext uri="{05A4C25C-085E-4340-85A3-A5531E510DB2}">
-      <thm15:themeFamily xmlns="" xmlns:thm15="http://schemas.microsoft.com/office/thememl/2012/main" name="Office Theme" id="{62F939B6-93AF-4DB8-9C6B-D6C7DFDC589F}" vid="{4A3C46E8-61CC-4603-A589-7422A47A8E4A}"/>
+      <thm15:themeFamily xmlns:thm15="http://schemas.microsoft.com/office/thememl/2012/main" xmlns="" name="Office Theme" id="{62F939B6-93AF-4DB8-9C6B-D6C7DFDC589F}" vid="{4A3C46E8-61CC-4603-A589-7422A47A8E4A}"/>
     </a:ext>
   </a:extLst>
 </a:theme>

</xml_diff>